<commit_message>
Anpassung Versionsnummer Pycharm 2017.3.3 -> 2017.3.4
</commit_message>
<xml_diff>
--- a/Präsentationen/Pycharm.pptx
+++ b/Präsentationen/Pycharm.pptx
@@ -306,7 +306,7 @@
                   <a:schemeClr val="tx2"/>
                 </a:solidFill>
               </a:rPr>
-              <a:t>22.02.2018</a:t>
+              <a:t>26.03.2018</a:t>
             </a:fld>
             <a:endParaRPr lang="de-DE">
               <a:solidFill>
@@ -656,7 +656,7 @@
             <a:fld id="{B4113CCE-1A1A-46DB-884A-AE560F65C3AF}" type="datetimeFigureOut">
               <a:rPr lang="de-DE" smtClean="0"/>
               <a:pPr/>
-              <a:t>22.02.2018</a:t>
+              <a:t>26.03.2018</a:t>
             </a:fld>
             <a:endParaRPr lang="de-DE"/>
           </a:p>
@@ -4381,7 +4381,7 @@
           <a:p>
             <a:fld id="{E0E6D715-0E9C-42CB-A8A5-C6A1B14D9CED}" type="datetime1">
               <a:rPr lang="de-DE" smtClean="0"/>
-              <a:t>22.02.2018</a:t>
+              <a:t>26.03.2018</a:t>
             </a:fld>
             <a:endParaRPr lang="de-DE"/>
           </a:p>
@@ -4514,7 +4514,7 @@
           <a:p>
             <a:fld id="{B9591D92-8187-4DD6-AC71-31E3436F25C5}" type="datetime1">
               <a:rPr lang="de-DE" smtClean="0"/>
-              <a:t>22.02.2018</a:t>
+              <a:t>26.03.2018</a:t>
             </a:fld>
             <a:endParaRPr lang="de-DE"/>
           </a:p>
@@ -4781,7 +4781,7 @@
           <a:p>
             <a:fld id="{BDC70302-3C85-46B3-98B5-B69FEC2E6590}" type="datetime1">
               <a:rPr lang="de-DE" smtClean="0"/>
-              <a:t>22.02.2018</a:t>
+              <a:t>26.03.2018</a:t>
             </a:fld>
             <a:endParaRPr lang="de-DE"/>
           </a:p>
@@ -4962,7 +4962,7 @@
           <a:p>
             <a:fld id="{7D5B56B2-D457-4E31-80B7-12196762C138}" type="datetime1">
               <a:rPr lang="de-DE" smtClean="0"/>
-              <a:t>22.02.2018</a:t>
+              <a:t>26.03.2018</a:t>
             </a:fld>
             <a:endParaRPr lang="de-DE"/>
           </a:p>
@@ -5091,7 +5091,7 @@
           <a:p>
             <a:fld id="{9166A2A0-AB75-4B8B-9C44-252E79BC818D}" type="datetime1">
               <a:rPr lang="de-DE" smtClean="0"/>
-              <a:t>22.02.2018</a:t>
+              <a:t>26.03.2018</a:t>
             </a:fld>
             <a:endParaRPr lang="de-DE"/>
           </a:p>
@@ -5197,7 +5197,7 @@
           <a:p>
             <a:fld id="{D42DA1F8-015D-4474-B19D-56CC651D10D0}" type="datetime1">
               <a:rPr lang="de-DE" smtClean="0"/>
-              <a:t>22.02.2018</a:t>
+              <a:t>26.03.2018</a:t>
             </a:fld>
             <a:endParaRPr lang="de-DE"/>
           </a:p>
@@ -5330,7 +5330,7 @@
           <a:p>
             <a:fld id="{51D674AF-F1DB-4409-8F19-7975BC8E901C}" type="datetime1">
               <a:rPr lang="de-DE" smtClean="0"/>
-              <a:t>22.02.2018</a:t>
+              <a:t>26.03.2018</a:t>
             </a:fld>
             <a:endParaRPr lang="de-DE"/>
           </a:p>
@@ -5487,7 +5487,7 @@
           <a:p>
             <a:fld id="{96AAB97B-A604-4A9C-B6DE-8F7A44DFE716}" type="datetime1">
               <a:rPr lang="de-DE" smtClean="0"/>
-              <a:t>22.02.2018</a:t>
+              <a:t>26.03.2018</a:t>
             </a:fld>
             <a:endParaRPr lang="de-DE"/>
           </a:p>
@@ -5696,7 +5696,7 @@
           <a:p>
             <a:fld id="{3C6F0BD4-2E3D-4627-BA92-963207075914}" type="datetime1">
               <a:rPr lang="de-DE" smtClean="0"/>
-              <a:t>22.02.2018</a:t>
+              <a:t>26.03.2018</a:t>
             </a:fld>
             <a:endParaRPr lang="de-DE"/>
           </a:p>
@@ -5905,7 +5905,7 @@
           <a:p>
             <a:fld id="{E68F1924-4272-48F6-BFF6-190750DFCE5E}" type="datetime1">
               <a:rPr lang="de-DE" smtClean="0"/>
-              <a:t>22.02.2018</a:t>
+              <a:t>26.03.2018</a:t>
             </a:fld>
             <a:endParaRPr lang="de-DE"/>
           </a:p>
@@ -6330,7 +6330,7 @@
           <a:p>
             <a:fld id="{52EC57A5-12C9-41C1-AABD-4FE5C29A1C1E}" type="datetime1">
               <a:rPr lang="de-DE" smtClean="0"/>
-              <a:t>22.02.2018</a:t>
+              <a:t>26.03.2018</a:t>
             </a:fld>
             <a:endParaRPr lang="de-DE" dirty="0"/>
           </a:p>
@@ -6914,7 +6914,7 @@
           <a:p>
             <a:fld id="{9E0CC5F4-F29B-418E-9286-8A6D06A1E757}" type="datetime1">
               <a:rPr lang="de-DE" smtClean="0"/>
-              <a:t>22.02.2018</a:t>
+              <a:t>26.03.2018</a:t>
             </a:fld>
             <a:endParaRPr lang="de-DE" dirty="0"/>
           </a:p>
@@ -7557,7 +7557,7 @@
           <a:p>
             <a:fld id="{BF197B32-FA23-4358-98A7-EECA7E71BD41}" type="datetime1">
               <a:rPr lang="de-DE" smtClean="0"/>
-              <a:t>22.02.2018</a:t>
+              <a:t>26.03.2018</a:t>
             </a:fld>
             <a:endParaRPr lang="de-DE"/>
           </a:p>
@@ -7619,11 +7619,11 @@
   <p:clrMapOvr>
     <a:masterClrMapping/>
   </p:clrMapOvr>
-  <mc:AlternateContent xmlns:mc="http://schemas.openxmlformats.org/markup-compatibility/2006">
-    <mc:Choice xmlns:p14="http://schemas.microsoft.com/office/powerpoint/2010/main" Requires="p14">
+  <mc:AlternateContent xmlns:mc="http://schemas.openxmlformats.org/markup-compatibility/2006" xmlns:p14="http://schemas.microsoft.com/office/powerpoint/2010/main">
+    <mc:Choice Requires="p14">
       <p:transition p14:dur="0"/>
     </mc:Choice>
-    <mc:Fallback>
+    <mc:Fallback xmlns="">
       <p:transition/>
     </mc:Fallback>
   </mc:AlternateContent>
@@ -7783,7 +7783,7 @@
           <a:p>
             <a:fld id="{7D5B56B2-D457-4E31-80B7-12196762C138}" type="datetime1">
               <a:rPr lang="de-DE" smtClean="0"/>
-              <a:t>22.02.2018</a:t>
+              <a:t>26.03.2018</a:t>
             </a:fld>
             <a:endParaRPr lang="de-DE"/>
           </a:p>
@@ -7845,11 +7845,11 @@
   <p:clrMapOvr>
     <a:masterClrMapping/>
   </p:clrMapOvr>
-  <mc:AlternateContent xmlns:mc="http://schemas.openxmlformats.org/markup-compatibility/2006">
-    <mc:Choice xmlns:p14="http://schemas.microsoft.com/office/powerpoint/2010/main" Requires="p14">
+  <mc:AlternateContent xmlns:mc="http://schemas.openxmlformats.org/markup-compatibility/2006" xmlns:p14="http://schemas.microsoft.com/office/powerpoint/2010/main">
+    <mc:Choice Requires="p14">
       <p:transition p14:dur="0"/>
     </mc:Choice>
-    <mc:Fallback>
+    <mc:Fallback xmlns="">
       <p:transition/>
     </mc:Fallback>
   </mc:AlternateContent>
@@ -8033,7 +8033,7 @@
           <a:p>
             <a:fld id="{7D5B56B2-D457-4E31-80B7-12196762C138}" type="datetime1">
               <a:rPr lang="de-DE" smtClean="0"/>
-              <a:t>22.02.2018</a:t>
+              <a:t>26.03.2018</a:t>
             </a:fld>
             <a:endParaRPr lang="de-DE"/>
           </a:p>
@@ -8095,11 +8095,11 @@
   <p:clrMapOvr>
     <a:masterClrMapping/>
   </p:clrMapOvr>
-  <mc:AlternateContent xmlns:mc="http://schemas.openxmlformats.org/markup-compatibility/2006">
-    <mc:Choice xmlns:p14="http://schemas.microsoft.com/office/powerpoint/2010/main" Requires="p14">
+  <mc:AlternateContent xmlns:mc="http://schemas.openxmlformats.org/markup-compatibility/2006" xmlns:p14="http://schemas.microsoft.com/office/powerpoint/2010/main">
+    <mc:Choice Requires="p14">
       <p:transition p14:dur="0"/>
     </mc:Choice>
-    <mc:Fallback>
+    <mc:Fallback xmlns="">
       <p:transition/>
     </mc:Fallback>
   </mc:AlternateContent>
@@ -8337,7 +8337,7 @@
             <a:fld id="{1488C8F6-7948-499E-B3F3-545F5D44CC45}" type="datetime1">
               <a:rPr lang="de-DE" smtClean="0"/>
               <a:pPr/>
-              <a:t>22.02.2018</a:t>
+              <a:t>26.03.2018</a:t>
             </a:fld>
             <a:endParaRPr lang="de-DE" dirty="0"/>
           </a:p>
@@ -8400,11 +8400,11 @@
   <p:clrMapOvr>
     <a:masterClrMapping/>
   </p:clrMapOvr>
-  <mc:AlternateContent xmlns:mc="http://schemas.openxmlformats.org/markup-compatibility/2006">
-    <mc:Choice xmlns:p14="http://schemas.microsoft.com/office/powerpoint/2010/main" Requires="p14">
+  <mc:AlternateContent xmlns:mc="http://schemas.openxmlformats.org/markup-compatibility/2006" xmlns:p14="http://schemas.microsoft.com/office/powerpoint/2010/main">
+    <mc:Choice Requires="p14">
       <p:transition p14:dur="0"/>
     </mc:Choice>
-    <mc:Fallback>
+    <mc:Fallback xmlns="">
       <p:transition/>
     </mc:Fallback>
   </mc:AlternateContent>
@@ -8725,7 +8725,7 @@
           <a:p>
             <a:fld id="{E1CC0198-1A73-46A9-99C9-76EB3EE8DB38}" type="datetime1">
               <a:rPr lang="de-DE" smtClean="0"/>
-              <a:t>22.02.2018</a:t>
+              <a:t>26.03.2018</a:t>
             </a:fld>
             <a:endParaRPr lang="de-DE" dirty="0"/>
           </a:p>
@@ -8787,11 +8787,11 @@
   <p:clrMapOvr>
     <a:masterClrMapping/>
   </p:clrMapOvr>
-  <mc:AlternateContent xmlns:mc="http://schemas.openxmlformats.org/markup-compatibility/2006">
-    <mc:Choice xmlns:p14="http://schemas.microsoft.com/office/powerpoint/2010/main" Requires="p14">
+  <mc:AlternateContent xmlns:mc="http://schemas.openxmlformats.org/markup-compatibility/2006" xmlns:p14="http://schemas.microsoft.com/office/powerpoint/2010/main">
+    <mc:Choice Requires="p14">
       <p:transition p14:dur="0"/>
     </mc:Choice>
-    <mc:Fallback>
+    <mc:Fallback xmlns="">
       <p:transition/>
     </mc:Fallback>
   </mc:AlternateContent>
@@ -8892,7 +8892,7 @@
           <a:p>
             <a:fld id="{7D5B56B2-D457-4E31-80B7-12196762C138}" type="datetime1">
               <a:rPr lang="de-DE" smtClean="0"/>
-              <a:t>22.02.2018</a:t>
+              <a:t>26.03.2018</a:t>
             </a:fld>
             <a:endParaRPr lang="de-DE"/>
           </a:p>
@@ -8954,11 +8954,11 @@
   <p:clrMapOvr>
     <a:masterClrMapping/>
   </p:clrMapOvr>
-  <mc:AlternateContent xmlns:mc="http://schemas.openxmlformats.org/markup-compatibility/2006">
-    <mc:Choice xmlns:p14="http://schemas.microsoft.com/office/powerpoint/2010/main" Requires="p14">
+  <mc:AlternateContent xmlns:mc="http://schemas.openxmlformats.org/markup-compatibility/2006" xmlns:p14="http://schemas.microsoft.com/office/powerpoint/2010/main">
+    <mc:Choice Requires="p14">
       <p:transition p14:dur="0"/>
     </mc:Choice>
-    <mc:Fallback>
+    <mc:Fallback xmlns="">
       <p:transition/>
     </mc:Fallback>
   </mc:AlternateContent>
@@ -9262,7 +9262,7 @@
           <a:p>
             <a:fld id="{978D60C7-52C0-4EAC-B41E-9B268717C8CE}" type="datetime1">
               <a:rPr lang="de-DE" smtClean="0"/>
-              <a:t>22.02.2018</a:t>
+              <a:t>26.03.2018</a:t>
             </a:fld>
             <a:endParaRPr lang="de-DE" dirty="0"/>
           </a:p>
@@ -9422,11 +9422,11 @@
   <p:clrMapOvr>
     <a:masterClrMapping/>
   </p:clrMapOvr>
-  <mc:AlternateContent xmlns:mc="http://schemas.openxmlformats.org/markup-compatibility/2006">
-    <mc:Choice xmlns:p14="http://schemas.microsoft.com/office/powerpoint/2010/main" Requires="p14">
+  <mc:AlternateContent xmlns:mc="http://schemas.openxmlformats.org/markup-compatibility/2006" xmlns:p14="http://schemas.microsoft.com/office/powerpoint/2010/main">
+    <mc:Choice Requires="p14">
       <p:transition p14:dur="0"/>
     </mc:Choice>
-    <mc:Fallback>
+    <mc:Fallback xmlns="">
       <p:transition/>
     </mc:Fallback>
   </mc:AlternateContent>
@@ -9559,7 +9559,7 @@
           <a:p>
             <a:fld id="{978D60C7-52C0-4EAC-B41E-9B268717C8CE}" type="datetime1">
               <a:rPr lang="de-DE" smtClean="0"/>
-              <a:t>22.02.2018</a:t>
+              <a:t>26.03.2018</a:t>
             </a:fld>
             <a:endParaRPr lang="de-DE" dirty="0"/>
           </a:p>
@@ -9719,11 +9719,11 @@
   <p:clrMapOvr>
     <a:masterClrMapping/>
   </p:clrMapOvr>
-  <mc:AlternateContent xmlns:mc="http://schemas.openxmlformats.org/markup-compatibility/2006">
-    <mc:Choice xmlns:p14="http://schemas.microsoft.com/office/powerpoint/2010/main" Requires="p14">
+  <mc:AlternateContent xmlns:mc="http://schemas.openxmlformats.org/markup-compatibility/2006" xmlns:p14="http://schemas.microsoft.com/office/powerpoint/2010/main">
+    <mc:Choice Requires="p14">
       <p:transition p14:dur="0"/>
     </mc:Choice>
-    <mc:Fallback>
+    <mc:Fallback xmlns="">
       <p:transition/>
     </mc:Fallback>
   </mc:AlternateContent>
@@ -10016,7 +10016,7 @@
           <a:p>
             <a:fld id="{3D1CC90E-5A3E-454C-93BC-C0FC350C62F6}" type="datetime1">
               <a:rPr lang="de-DE" smtClean="0"/>
-              <a:t>22.02.2018</a:t>
+              <a:t>26.03.2018</a:t>
             </a:fld>
             <a:endParaRPr lang="de-DE" dirty="0"/>
           </a:p>
@@ -10238,11 +10238,11 @@
   <p:clrMapOvr>
     <a:masterClrMapping/>
   </p:clrMapOvr>
-  <mc:AlternateContent xmlns:mc="http://schemas.openxmlformats.org/markup-compatibility/2006">
-    <mc:Choice xmlns:p14="http://schemas.microsoft.com/office/powerpoint/2010/main" Requires="p14">
+  <mc:AlternateContent xmlns:mc="http://schemas.openxmlformats.org/markup-compatibility/2006" xmlns:p14="http://schemas.microsoft.com/office/powerpoint/2010/main">
+    <mc:Choice Requires="p14">
       <p:transition p14:dur="0"/>
     </mc:Choice>
-    <mc:Fallback>
+    <mc:Fallback xmlns="">
       <p:transition/>
     </mc:Fallback>
   </mc:AlternateContent>
@@ -10381,7 +10381,7 @@
           <a:p>
             <a:fld id="{7D5B56B2-D457-4E31-80B7-12196762C138}" type="datetime1">
               <a:rPr lang="de-DE" smtClean="0"/>
-              <a:t>22.02.2018</a:t>
+              <a:t>26.03.2018</a:t>
             </a:fld>
             <a:endParaRPr lang="de-DE"/>
           </a:p>
@@ -10443,11 +10443,11 @@
   <p:clrMapOvr>
     <a:masterClrMapping/>
   </p:clrMapOvr>
-  <mc:AlternateContent xmlns:mc="http://schemas.openxmlformats.org/markup-compatibility/2006">
-    <mc:Choice xmlns:p14="http://schemas.microsoft.com/office/powerpoint/2010/main" Requires="p14">
+  <mc:AlternateContent xmlns:mc="http://schemas.openxmlformats.org/markup-compatibility/2006" xmlns:p14="http://schemas.microsoft.com/office/powerpoint/2010/main">
+    <mc:Choice Requires="p14">
       <p:transition p14:dur="0"/>
     </mc:Choice>
-    <mc:Fallback>
+    <mc:Fallback xmlns="">
       <p:transition/>
     </mc:Fallback>
   </mc:AlternateContent>
@@ -10827,7 +10827,7 @@
           <a:p>
             <a:fld id="{20DC40FA-A22B-48BB-8D53-984419E13B62}" type="datetime1">
               <a:rPr lang="de-DE" smtClean="0"/>
-              <a:t>22.02.2018</a:t>
+              <a:t>26.03.2018</a:t>
             </a:fld>
             <a:endParaRPr lang="de-DE" dirty="0"/>
           </a:p>
@@ -10889,11 +10889,11 @@
   <p:clrMapOvr>
     <a:masterClrMapping/>
   </p:clrMapOvr>
-  <mc:AlternateContent xmlns:mc="http://schemas.openxmlformats.org/markup-compatibility/2006">
-    <mc:Choice xmlns:p14="http://schemas.microsoft.com/office/powerpoint/2010/main" Requires="p14">
+  <mc:AlternateContent xmlns:mc="http://schemas.openxmlformats.org/markup-compatibility/2006" xmlns:p14="http://schemas.microsoft.com/office/powerpoint/2010/main">
+    <mc:Choice Requires="p14">
       <p:transition p14:dur="0"/>
     </mc:Choice>
-    <mc:Fallback>
+    <mc:Fallback xmlns="">
       <p:transition/>
     </mc:Fallback>
   </mc:AlternateContent>
@@ -11005,7 +11005,7 @@
           <a:p>
             <a:fld id="{3864C030-6135-44B0-963A-565E8643FD94}" type="datetime1">
               <a:rPr lang="de-DE" smtClean="0"/>
-              <a:t>22.02.2018</a:t>
+              <a:t>26.03.2018</a:t>
             </a:fld>
             <a:endParaRPr lang="de-DE"/>
           </a:p>
@@ -11067,11 +11067,11 @@
   <p:clrMapOvr>
     <a:masterClrMapping/>
   </p:clrMapOvr>
-  <mc:AlternateContent xmlns:mc="http://schemas.openxmlformats.org/markup-compatibility/2006">
-    <mc:Choice xmlns:p14="http://schemas.microsoft.com/office/powerpoint/2010/main" Requires="p14">
+  <mc:AlternateContent xmlns:mc="http://schemas.openxmlformats.org/markup-compatibility/2006" xmlns:p14="http://schemas.microsoft.com/office/powerpoint/2010/main">
+    <mc:Choice Requires="p14">
       <p:transition p14:dur="0"/>
     </mc:Choice>
-    <mc:Fallback>
+    <mc:Fallback xmlns="">
       <p:transition/>
     </mc:Fallback>
   </mc:AlternateContent>
@@ -11142,7 +11142,7 @@
           <a:p>
             <a:fld id="{0D12B559-D508-491C-BFE1-BF16B919FFF6}" type="datetime1">
               <a:rPr lang="de-DE" smtClean="0"/>
-              <a:t>22.02.2018</a:t>
+              <a:t>26.03.2018</a:t>
             </a:fld>
             <a:endParaRPr lang="de-DE" dirty="0"/>
           </a:p>
@@ -11435,11 +11435,11 @@
   <p:clrMapOvr>
     <a:masterClrMapping/>
   </p:clrMapOvr>
-  <mc:AlternateContent xmlns:mc="http://schemas.openxmlformats.org/markup-compatibility/2006">
-    <mc:Choice xmlns:p14="http://schemas.microsoft.com/office/powerpoint/2010/main" Requires="p14">
+  <mc:AlternateContent xmlns:mc="http://schemas.openxmlformats.org/markup-compatibility/2006" xmlns:p14="http://schemas.microsoft.com/office/powerpoint/2010/main">
+    <mc:Choice Requires="p14">
       <p:transition p14:dur="0"/>
     </mc:Choice>
-    <mc:Fallback>
+    <mc:Fallback xmlns="">
       <p:transition/>
     </mc:Fallback>
   </mc:AlternateContent>
@@ -11749,7 +11749,7 @@
           <a:p>
             <a:fld id="{D78EC7EB-AE89-4914-855C-E625BCEB3644}" type="datetime1">
               <a:rPr lang="de-DE" smtClean="0"/>
-              <a:t>22.02.2018</a:t>
+              <a:t>26.03.2018</a:t>
             </a:fld>
             <a:endParaRPr lang="de-DE" dirty="0"/>
           </a:p>
@@ -11857,11 +11857,11 @@
   <p:clrMapOvr>
     <a:masterClrMapping/>
   </p:clrMapOvr>
-  <mc:AlternateContent xmlns:mc="http://schemas.openxmlformats.org/markup-compatibility/2006">
-    <mc:Choice xmlns:p14="http://schemas.microsoft.com/office/powerpoint/2010/main" Requires="p14">
+  <mc:AlternateContent xmlns:mc="http://schemas.openxmlformats.org/markup-compatibility/2006" xmlns:p14="http://schemas.microsoft.com/office/powerpoint/2010/main">
+    <mc:Choice Requires="p14">
       <p:transition p14:dur="0"/>
     </mc:Choice>
-    <mc:Fallback>
+    <mc:Fallback xmlns="">
       <p:transition/>
     </mc:Fallback>
   </mc:AlternateContent>
@@ -12516,7 +12516,7 @@
           <a:p>
             <a:fld id="{63B1C509-C1F4-4BFF-9DD1-0423BA46D221}" type="datetime1">
               <a:rPr lang="de-DE" smtClean="0"/>
-              <a:t>22.02.2018</a:t>
+              <a:t>26.03.2018</a:t>
             </a:fld>
             <a:endParaRPr lang="de-DE" dirty="0"/>
           </a:p>
@@ -12578,11 +12578,11 @@
   <p:clrMapOvr>
     <a:masterClrMapping/>
   </p:clrMapOvr>
-  <mc:AlternateContent xmlns:mc="http://schemas.openxmlformats.org/markup-compatibility/2006">
-    <mc:Choice xmlns:p14="http://schemas.microsoft.com/office/powerpoint/2010/main" Requires="p14">
+  <mc:AlternateContent xmlns:mc="http://schemas.openxmlformats.org/markup-compatibility/2006" xmlns:p14="http://schemas.microsoft.com/office/powerpoint/2010/main">
+    <mc:Choice Requires="p14">
       <p:transition p14:dur="0"/>
     </mc:Choice>
-    <mc:Fallback>
+    <mc:Fallback xmlns="">
       <p:transition/>
     </mc:Fallback>
   </mc:AlternateContent>
@@ -12653,7 +12653,7 @@
           <a:p>
             <a:fld id="{E8353813-5009-498F-9114-327FA5B64742}" type="datetime1">
               <a:rPr lang="de-DE" smtClean="0"/>
-              <a:t>22.02.2018</a:t>
+              <a:t>26.03.2018</a:t>
             </a:fld>
             <a:endParaRPr lang="de-DE" dirty="0"/>
           </a:p>
@@ -12912,11 +12912,11 @@
   <p:clrMapOvr>
     <a:masterClrMapping/>
   </p:clrMapOvr>
-  <mc:AlternateContent xmlns:mc="http://schemas.openxmlformats.org/markup-compatibility/2006">
-    <mc:Choice xmlns:p14="http://schemas.microsoft.com/office/powerpoint/2010/main" Requires="p14">
+  <mc:AlternateContent xmlns:mc="http://schemas.openxmlformats.org/markup-compatibility/2006" xmlns:p14="http://schemas.microsoft.com/office/powerpoint/2010/main">
+    <mc:Choice Requires="p14">
       <p:transition p14:dur="0"/>
     </mc:Choice>
-    <mc:Fallback>
+    <mc:Fallback xmlns="">
       <p:transition/>
     </mc:Fallback>
   </mc:AlternateContent>
@@ -13065,7 +13065,7 @@
           <a:p>
             <a:fld id="{F1310D82-6A30-4DE3-A06C-4E48F3C2BA64}" type="datetime1">
               <a:rPr lang="de-DE" smtClean="0"/>
-              <a:t>22.02.2018</a:t>
+              <a:t>26.03.2018</a:t>
             </a:fld>
             <a:endParaRPr lang="de-DE"/>
           </a:p>
@@ -13127,11 +13127,11 @@
   <p:clrMapOvr>
     <a:masterClrMapping/>
   </p:clrMapOvr>
-  <mc:AlternateContent xmlns:mc="http://schemas.openxmlformats.org/markup-compatibility/2006">
-    <mc:Choice xmlns:p14="http://schemas.microsoft.com/office/powerpoint/2010/main" Requires="p14">
+  <mc:AlternateContent xmlns:mc="http://schemas.openxmlformats.org/markup-compatibility/2006" xmlns:p14="http://schemas.microsoft.com/office/powerpoint/2010/main">
+    <mc:Choice Requires="p14">
       <p:transition p14:dur="0"/>
     </mc:Choice>
-    <mc:Fallback>
+    <mc:Fallback xmlns="">
       <p:transition/>
     </mc:Fallback>
   </mc:AlternateContent>
@@ -13252,7 +13252,7 @@
           <a:p>
             <a:fld id="{F1310D82-6A30-4DE3-A06C-4E48F3C2BA64}" type="datetime1">
               <a:rPr lang="de-DE" smtClean="0"/>
-              <a:t>22.02.2018</a:t>
+              <a:t>26.03.2018</a:t>
             </a:fld>
             <a:endParaRPr lang="de-DE"/>
           </a:p>
@@ -13314,11 +13314,11 @@
   <p:clrMapOvr>
     <a:masterClrMapping/>
   </p:clrMapOvr>
-  <mc:AlternateContent xmlns:mc="http://schemas.openxmlformats.org/markup-compatibility/2006">
-    <mc:Choice xmlns:p14="http://schemas.microsoft.com/office/powerpoint/2010/main" Requires="p14">
+  <mc:AlternateContent xmlns:mc="http://schemas.openxmlformats.org/markup-compatibility/2006" xmlns:p14="http://schemas.microsoft.com/office/powerpoint/2010/main">
+    <mc:Choice Requires="p14">
       <p:transition p14:dur="0"/>
     </mc:Choice>
-    <mc:Fallback>
+    <mc:Fallback xmlns="">
       <p:transition/>
     </mc:Fallback>
   </mc:AlternateContent>
@@ -13413,7 +13413,7 @@
           <a:p>
             <a:fld id="{CBE1475B-97F9-4458-B0D2-C52B31AF1C9A}" type="datetime1">
               <a:rPr lang="de-DE" smtClean="0"/>
-              <a:t>22.02.2018</a:t>
+              <a:t>26.03.2018</a:t>
             </a:fld>
             <a:endParaRPr lang="de-DE"/>
           </a:p>
@@ -13475,11 +13475,11 @@
   <p:clrMapOvr>
     <a:masterClrMapping/>
   </p:clrMapOvr>
-  <mc:AlternateContent xmlns:mc="http://schemas.openxmlformats.org/markup-compatibility/2006">
-    <mc:Choice xmlns:p14="http://schemas.microsoft.com/office/powerpoint/2010/main" Requires="p14">
+  <mc:AlternateContent xmlns:mc="http://schemas.openxmlformats.org/markup-compatibility/2006" xmlns:p14="http://schemas.microsoft.com/office/powerpoint/2010/main">
+    <mc:Choice Requires="p14">
       <p:transition p14:dur="0"/>
     </mc:Choice>
-    <mc:Fallback>
+    <mc:Fallback xmlns="">
       <p:transition/>
     </mc:Fallback>
   </mc:AlternateContent>
@@ -13591,7 +13591,7 @@
           <a:p>
             <a:fld id="{3C6F0BD4-2E3D-4627-BA92-963207075914}" type="datetime1">
               <a:rPr lang="de-DE" smtClean="0"/>
-              <a:t>22.02.2018</a:t>
+              <a:t>26.03.2018</a:t>
             </a:fld>
             <a:endParaRPr lang="de-DE"/>
           </a:p>
@@ -13653,11 +13653,11 @@
   <p:clrMapOvr>
     <a:masterClrMapping/>
   </p:clrMapOvr>
-  <mc:AlternateContent xmlns:mc="http://schemas.openxmlformats.org/markup-compatibility/2006">
-    <mc:Choice xmlns:p14="http://schemas.microsoft.com/office/powerpoint/2010/main" Requires="p14">
+  <mc:AlternateContent xmlns:mc="http://schemas.openxmlformats.org/markup-compatibility/2006" xmlns:p14="http://schemas.microsoft.com/office/powerpoint/2010/main">
+    <mc:Choice Requires="p14">
       <p:transition p14:dur="0"/>
     </mc:Choice>
-    <mc:Fallback>
+    <mc:Fallback xmlns="">
       <p:transition/>
     </mc:Fallback>
   </mc:AlternateContent>
@@ -13791,7 +13791,7 @@
           <a:p>
             <a:fld id="{3C6F0BD4-2E3D-4627-BA92-963207075914}" type="datetime1">
               <a:rPr lang="de-DE" smtClean="0"/>
-              <a:t>22.02.2018</a:t>
+              <a:t>26.03.2018</a:t>
             </a:fld>
             <a:endParaRPr lang="de-DE"/>
           </a:p>
@@ -13853,11 +13853,11 @@
   <p:clrMapOvr>
     <a:masterClrMapping/>
   </p:clrMapOvr>
-  <mc:AlternateContent xmlns:mc="http://schemas.openxmlformats.org/markup-compatibility/2006">
-    <mc:Choice xmlns:p14="http://schemas.microsoft.com/office/powerpoint/2010/main" Requires="p14">
+  <mc:AlternateContent xmlns:mc="http://schemas.openxmlformats.org/markup-compatibility/2006" xmlns:p14="http://schemas.microsoft.com/office/powerpoint/2010/main">
+    <mc:Choice Requires="p14">
       <p:transition p14:dur="0"/>
     </mc:Choice>
-    <mc:Fallback>
+    <mc:Fallback xmlns="">
       <p:transition/>
     </mc:Fallback>
   </mc:AlternateContent>
@@ -14031,7 +14031,7 @@
           <a:p>
             <a:fld id="{BDC70302-3C85-46B3-98B5-B69FEC2E6590}" type="datetime1">
               <a:rPr lang="de-DE" smtClean="0"/>
-              <a:t>22.02.2018</a:t>
+              <a:t>26.03.2018</a:t>
             </a:fld>
             <a:endParaRPr lang="de-DE"/>
           </a:p>
@@ -14215,11 +14215,11 @@
   <p:clrMapOvr>
     <a:masterClrMapping/>
   </p:clrMapOvr>
-  <mc:AlternateContent xmlns:mc="http://schemas.openxmlformats.org/markup-compatibility/2006">
-    <mc:Choice xmlns:p14="http://schemas.microsoft.com/office/powerpoint/2010/main" Requires="p14">
+  <mc:AlternateContent xmlns:mc="http://schemas.openxmlformats.org/markup-compatibility/2006" xmlns:p14="http://schemas.microsoft.com/office/powerpoint/2010/main">
+    <mc:Choice Requires="p14">
       <p:transition p14:dur="0"/>
     </mc:Choice>
-    <mc:Fallback>
+    <mc:Fallback xmlns="">
       <p:transition/>
     </mc:Fallback>
   </mc:AlternateContent>
@@ -14429,7 +14429,7 @@
           <a:p>
             <a:fld id="{7D5B56B2-D457-4E31-80B7-12196762C138}" type="datetime1">
               <a:rPr lang="de-DE" smtClean="0"/>
-              <a:t>22.02.2018</a:t>
+              <a:t>26.03.2018</a:t>
             </a:fld>
             <a:endParaRPr lang="de-DE"/>
           </a:p>
@@ -14491,11 +14491,11 @@
   <p:clrMapOvr>
     <a:masterClrMapping/>
   </p:clrMapOvr>
-  <mc:AlternateContent xmlns:mc="http://schemas.openxmlformats.org/markup-compatibility/2006">
-    <mc:Choice xmlns:p14="http://schemas.microsoft.com/office/powerpoint/2010/main" Requires="p14">
+  <mc:AlternateContent xmlns:mc="http://schemas.openxmlformats.org/markup-compatibility/2006" xmlns:p14="http://schemas.microsoft.com/office/powerpoint/2010/main">
+    <mc:Choice Requires="p14">
       <p:transition p14:dur="0"/>
     </mc:Choice>
-    <mc:Fallback>
+    <mc:Fallback xmlns="">
       <p:transition/>
     </mc:Fallback>
   </mc:AlternateContent>
@@ -14582,7 +14582,7 @@
               <a:rPr lang="de-DE" dirty="0" smtClean="0">
                 <a:hlinkClick r:id="rId3"/>
               </a:rPr>
-              <a:t>download.jetbrains.com/python/pycharm-community-2017.3.3.tar.gz</a:t>
+              <a:t>download.jetbrains.com/python/pycharm-community-2017.3.4.tar.gz</a:t>
             </a:r>
             <a:endParaRPr lang="de-DE" dirty="0" smtClean="0"/>
           </a:p>
@@ -14638,7 +14638,7 @@
           <a:p>
             <a:fld id="{7D5B56B2-D457-4E31-80B7-12196762C138}" type="datetime1">
               <a:rPr lang="de-DE" smtClean="0"/>
-              <a:t>22.02.2018</a:t>
+              <a:t>26.03.2018</a:t>
             </a:fld>
             <a:endParaRPr lang="de-DE"/>
           </a:p>
@@ -14700,11 +14700,11 @@
   <p:clrMapOvr>
     <a:masterClrMapping/>
   </p:clrMapOvr>
-  <mc:AlternateContent xmlns:mc="http://schemas.openxmlformats.org/markup-compatibility/2006">
-    <mc:Choice xmlns:p14="http://schemas.microsoft.com/office/powerpoint/2010/main" Requires="p14">
+  <mc:AlternateContent xmlns:mc="http://schemas.openxmlformats.org/markup-compatibility/2006" xmlns:p14="http://schemas.microsoft.com/office/powerpoint/2010/main">
+    <mc:Choice Requires="p14">
       <p:transition p14:dur="0"/>
     </mc:Choice>
-    <mc:Fallback>
+    <mc:Fallback xmlns="">
       <p:transition/>
     </mc:Fallback>
   </mc:AlternateContent>
@@ -14787,8 +14787,13 @@
             </a:r>
             <a:r>
               <a:rPr lang="de-DE" dirty="0" smtClean="0"/>
-              <a:t> pycharm-community-2017.3.3.tar.gz</a:t>
-            </a:r>
+              <a:t> </a:t>
+            </a:r>
+            <a:r>
+              <a:rPr lang="de-DE" dirty="0" smtClean="0"/>
+              <a:t>pycharm-community-2017.3.4.tar.gz</a:t>
+            </a:r>
+            <a:endParaRPr lang="de-DE" dirty="0" smtClean="0"/>
           </a:p>
           <a:p>
             <a:pPr lvl="1"/>
@@ -14862,7 +14867,7 @@
           <a:p>
             <a:fld id="{7D5B56B2-D457-4E31-80B7-12196762C138}" type="datetime1">
               <a:rPr lang="de-DE" smtClean="0"/>
-              <a:t>22.02.2018</a:t>
+              <a:t>26.03.2018</a:t>
             </a:fld>
             <a:endParaRPr lang="de-DE"/>
           </a:p>
@@ -14924,11 +14929,11 @@
   <p:clrMapOvr>
     <a:masterClrMapping/>
   </p:clrMapOvr>
-  <mc:AlternateContent xmlns:mc="http://schemas.openxmlformats.org/markup-compatibility/2006">
-    <mc:Choice xmlns:p14="http://schemas.microsoft.com/office/powerpoint/2010/main" Requires="p14">
+  <mc:AlternateContent xmlns:mc="http://schemas.openxmlformats.org/markup-compatibility/2006" xmlns:p14="http://schemas.microsoft.com/office/powerpoint/2010/main">
+    <mc:Choice Requires="p14">
       <p:transition p14:dur="0"/>
     </mc:Choice>
-    <mc:Fallback>
+    <mc:Fallback xmlns="">
       <p:transition/>
     </mc:Fallback>
   </mc:AlternateContent>
@@ -14999,7 +15004,11 @@
           <a:p>
             <a:r>
               <a:rPr lang="de-DE" dirty="0" smtClean="0"/>
-              <a:t>mv pycharm-community-2017.3.3 </a:t>
+              <a:t>mv </a:t>
+            </a:r>
+            <a:r>
+              <a:rPr lang="de-DE" dirty="0" smtClean="0"/>
+              <a:t>pycharm-community-2017.3.4 </a:t>
             </a:r>
             <a:r>
               <a:rPr lang="de-DE" dirty="0" err="1" smtClean="0"/>
@@ -15014,8 +15023,13 @@
             </a:r>
             <a:r>
               <a:rPr lang="de-DE" dirty="0" smtClean="0"/>
-              <a:t> pycharm-community-2017.3.3.tar.gz</a:t>
-            </a:r>
+              <a:t> </a:t>
+            </a:r>
+            <a:r>
+              <a:rPr lang="de-DE" dirty="0" smtClean="0"/>
+              <a:t>pycharm-community-2017.3.4.tar.gz</a:t>
+            </a:r>
+            <a:endParaRPr lang="de-DE" dirty="0" smtClean="0"/>
           </a:p>
           <a:p>
             <a:endParaRPr lang="de-DE" dirty="0"/>
@@ -15039,7 +15053,7 @@
           <a:p>
             <a:fld id="{7D5B56B2-D457-4E31-80B7-12196762C138}" type="datetime1">
               <a:rPr lang="de-DE" smtClean="0"/>
-              <a:t>22.02.2018</a:t>
+              <a:t>26.03.2018</a:t>
             </a:fld>
             <a:endParaRPr lang="de-DE"/>
           </a:p>
@@ -15101,11 +15115,11 @@
   <p:clrMapOvr>
     <a:masterClrMapping/>
   </p:clrMapOvr>
-  <mc:AlternateContent xmlns:mc="http://schemas.openxmlformats.org/markup-compatibility/2006">
-    <mc:Choice xmlns:p14="http://schemas.microsoft.com/office/powerpoint/2010/main" Requires="p14">
+  <mc:AlternateContent xmlns:mc="http://schemas.openxmlformats.org/markup-compatibility/2006" xmlns:p14="http://schemas.microsoft.com/office/powerpoint/2010/main">
+    <mc:Choice Requires="p14">
       <p:transition p14:dur="0"/>
     </mc:Choice>
-    <mc:Fallback>
+    <mc:Fallback xmlns="">
       <p:transition/>
     </mc:Fallback>
   </mc:AlternateContent>

</xml_diff>